<commit_message>
Upload of Overleaf backup
</commit_message>
<xml_diff>
--- a/results/images/predicted_average_of_lines.pptx
+++ b/results/images/predicted_average_of_lines.pptx
@@ -134,10 +134,10 @@
           <c:layoutTarget val="inner"/>
           <c:xMode val="edge"/>
           <c:yMode val="edge"/>
-          <c:x val="0.16420133420822394"/>
-          <c:y val="0.16440463025074389"/>
-          <c:w val="0.70169455380577439"/>
-          <c:h val="0.64846862892138479"/>
+          <c:x val="0.16697911198600174"/>
+          <c:y val="0.15845222472190976"/>
+          <c:w val="0.70308344269466316"/>
+          <c:h val="0.65838926384201957"/>
         </c:manualLayout>
       </c:layout>
       <c:barChart>
@@ -149,7 +149,7 @@
           <c:order val="0"/>
           <c:tx>
             <c:strRef>
-              <c:f>predicted_documentation_analysi!$B$4</c:f>
+              <c:f>'Average per Category'!$B$4</c:f>
               <c:strCache>
                 <c:ptCount val="1"/>
                 <c:pt idx="0">
@@ -172,7 +172,7 @@
           <c:invertIfNegative val="0"/>
           <c:cat>
             <c:strRef>
-              <c:f>predicted_documentation_analysi!$C$2:$I$3</c:f>
+              <c:f>'Average per Category'!$C$2:$I$3</c:f>
               <c:strCache>
                 <c:ptCount val="7"/>
                 <c:pt idx="0">
@@ -201,7 +201,7 @@
           </c:cat>
           <c:val>
             <c:numRef>
-              <c:f>predicted_documentation_analysi!$C$4:$I$4</c:f>
+              <c:f>'Average per Category'!$C$4:$I$4</c:f>
               <c:numCache>
                 <c:formatCode>General</c:formatCode>
                 <c:ptCount val="7"/>
@@ -209,16 +209,16 @@
                   <c:v>332</c:v>
                 </c:pt>
                 <c:pt idx="1">
-                  <c:v>530</c:v>
+                  <c:v>531</c:v>
                 </c:pt>
                 <c:pt idx="2">
-                  <c:v>1649</c:v>
+                  <c:v>1648</c:v>
                 </c:pt>
                 <c:pt idx="3">
-                  <c:v>1163</c:v>
+                  <c:v>1162</c:v>
                 </c:pt>
                 <c:pt idx="4">
-                  <c:v>1661</c:v>
+                  <c:v>1660</c:v>
                 </c:pt>
                 <c:pt idx="5">
                   <c:v>2192</c:v>
@@ -231,7 +231,7 @@
           </c:val>
           <c:extLst>
             <c:ext xmlns:c16="http://schemas.microsoft.com/office/drawing/2014/chart" uri="{C3380CC4-5D6E-409C-BE32-E72D297353CC}">
-              <c16:uniqueId val="{00000000-53F6-4569-B92F-67E6D731B65D}"/>
+              <c16:uniqueId val="{00000000-EDE6-4432-B529-0C313B26323E}"/>
             </c:ext>
           </c:extLst>
         </c:ser>
@@ -256,7 +256,7 @@
           <c:order val="1"/>
           <c:tx>
             <c:strRef>
-              <c:f>predicted_documentation_analysi!$B$5</c:f>
+              <c:f>'Average per Category'!$B$5</c:f>
               <c:strCache>
                 <c:ptCount val="1"/>
                 <c:pt idx="0">
@@ -307,13 +307,13 @@
             <c:bubble3D val="0"/>
             <c:extLst>
               <c:ext xmlns:c16="http://schemas.microsoft.com/office/drawing/2014/chart" uri="{C3380CC4-5D6E-409C-BE32-E72D297353CC}">
-                <c16:uniqueId val="{00000001-53F6-4569-B92F-67E6D731B65D}"/>
+                <c16:uniqueId val="{00000001-EDE6-4432-B529-0C313B26323E}"/>
               </c:ext>
             </c:extLst>
           </c:dPt>
           <c:cat>
             <c:strRef>
-              <c:f>predicted_documentation_analysi!$C$2:$I$3</c:f>
+              <c:f>'Average per Category'!$C$2:$I$3</c:f>
               <c:strCache>
                 <c:ptCount val="7"/>
                 <c:pt idx="0">
@@ -342,9 +342,9 @@
           </c:cat>
           <c:val>
             <c:numRef>
-              <c:f>predicted_documentation_analysi!$C$5:$I$5</c:f>
+              <c:f>'Average per Category'!$C$5:$I$5</c:f>
               <c:numCache>
-                <c:formatCode>General</c:formatCode>
+                <c:formatCode>0</c:formatCode>
                 <c:ptCount val="7"/>
                 <c:pt idx="0">
                   <c:v>0.20519594892118009</c:v>
@@ -373,7 +373,7 @@
           <c:smooth val="1"/>
           <c:extLst>
             <c:ext xmlns:c16="http://schemas.microsoft.com/office/drawing/2014/chart" uri="{C3380CC4-5D6E-409C-BE32-E72D297353CC}">
-              <c16:uniqueId val="{00000002-53F6-4569-B92F-67E6D731B65D}"/>
+              <c16:uniqueId val="{00000002-EDE6-4432-B529-0C313B26323E}"/>
             </c:ext>
           </c:extLst>
         </c:ser>
@@ -477,14 +477,10 @@
                 </a:pPr>
                 <a:r>
                   <a:rPr lang="en-US" dirty="0"/>
-                  <a:t>#</a:t>
+                  <a:t># </a:t>
                 </a:r>
                 <a:r>
-                  <a:rPr lang="en-US" baseline="0" dirty="0"/>
-                  <a:t> </a:t>
-                </a:r>
-                <a:r>
-                  <a:rPr lang="en-US" baseline="0" dirty="0" err="1"/>
+                  <a:rPr lang="en-US" dirty="0" err="1"/>
                   <a:t>Projetos</a:t>
                 </a:r>
                 <a:endParaRPr lang="en-US" dirty="0"/>
@@ -496,7 +492,7 @@
               <c:xMode val="edge"/>
               <c:yMode val="edge"/>
               <c:x val="4.1666666666666666E-3"/>
-              <c:y val="0.39117735283089616"/>
+              <c:y val="0.35943128775618527"/>
             </c:manualLayout>
           </c:layout>
           <c:overlay val="0"/>
@@ -596,8 +592,8 @@
             <c:manualLayout>
               <c:xMode val="edge"/>
               <c:yMode val="edge"/>
-              <c:x val="0.94511111111111112"/>
-              <c:y val="0.42985642419697528"/>
+              <c:x val="0.95066666666666688"/>
+              <c:y val="0.4298564060943344"/>
             </c:manualLayout>
           </c:layout>
           <c:overlay val="0"/>
@@ -626,7 +622,7 @@
             </a:p>
           </c:txPr>
         </c:title>
-        <c:numFmt formatCode="General" sourceLinked="1"/>
+        <c:numFmt formatCode="0" sourceLinked="1"/>
         <c:majorTickMark val="out"/>
         <c:minorTickMark val="none"/>
         <c:tickLblPos val="nextTo"/>
@@ -1435,7 +1431,7 @@
           <a:p>
             <a:fld id="{857C8E90-7EDD-4CDC-BF79-D3D421C99482}" type="datetimeFigureOut">
               <a:rPr lang="en-US" smtClean="0"/>
-              <a:t>12/12/2022</a:t>
+              <a:t>12/13/2022</a:t>
             </a:fld>
             <a:endParaRPr lang="en-US"/>
           </a:p>
@@ -1605,7 +1601,7 @@
           <a:p>
             <a:fld id="{857C8E90-7EDD-4CDC-BF79-D3D421C99482}" type="datetimeFigureOut">
               <a:rPr lang="en-US" smtClean="0"/>
-              <a:t>12/12/2022</a:t>
+              <a:t>12/13/2022</a:t>
             </a:fld>
             <a:endParaRPr lang="en-US"/>
           </a:p>
@@ -1785,7 +1781,7 @@
           <a:p>
             <a:fld id="{857C8E90-7EDD-4CDC-BF79-D3D421C99482}" type="datetimeFigureOut">
               <a:rPr lang="en-US" smtClean="0"/>
-              <a:t>12/12/2022</a:t>
+              <a:t>12/13/2022</a:t>
             </a:fld>
             <a:endParaRPr lang="en-US"/>
           </a:p>
@@ -1955,7 +1951,7 @@
           <a:p>
             <a:fld id="{857C8E90-7EDD-4CDC-BF79-D3D421C99482}" type="datetimeFigureOut">
               <a:rPr lang="en-US" smtClean="0"/>
-              <a:t>12/12/2022</a:t>
+              <a:t>12/13/2022</a:t>
             </a:fld>
             <a:endParaRPr lang="en-US"/>
           </a:p>
@@ -2199,7 +2195,7 @@
           <a:p>
             <a:fld id="{857C8E90-7EDD-4CDC-BF79-D3D421C99482}" type="datetimeFigureOut">
               <a:rPr lang="en-US" smtClean="0"/>
-              <a:t>12/12/2022</a:t>
+              <a:t>12/13/2022</a:t>
             </a:fld>
             <a:endParaRPr lang="en-US"/>
           </a:p>
@@ -2431,7 +2427,7 @@
           <a:p>
             <a:fld id="{857C8E90-7EDD-4CDC-BF79-D3D421C99482}" type="datetimeFigureOut">
               <a:rPr lang="en-US" smtClean="0"/>
-              <a:t>12/12/2022</a:t>
+              <a:t>12/13/2022</a:t>
             </a:fld>
             <a:endParaRPr lang="en-US"/>
           </a:p>
@@ -2798,7 +2794,7 @@
           <a:p>
             <a:fld id="{857C8E90-7EDD-4CDC-BF79-D3D421C99482}" type="datetimeFigureOut">
               <a:rPr lang="en-US" smtClean="0"/>
-              <a:t>12/12/2022</a:t>
+              <a:t>12/13/2022</a:t>
             </a:fld>
             <a:endParaRPr lang="en-US"/>
           </a:p>
@@ -2916,7 +2912,7 @@
           <a:p>
             <a:fld id="{857C8E90-7EDD-4CDC-BF79-D3D421C99482}" type="datetimeFigureOut">
               <a:rPr lang="en-US" smtClean="0"/>
-              <a:t>12/12/2022</a:t>
+              <a:t>12/13/2022</a:t>
             </a:fld>
             <a:endParaRPr lang="en-US"/>
           </a:p>
@@ -3011,7 +3007,7 @@
           <a:p>
             <a:fld id="{857C8E90-7EDD-4CDC-BF79-D3D421C99482}" type="datetimeFigureOut">
               <a:rPr lang="en-US" smtClean="0"/>
-              <a:t>12/12/2022</a:t>
+              <a:t>12/13/2022</a:t>
             </a:fld>
             <a:endParaRPr lang="en-US"/>
           </a:p>
@@ -3288,7 +3284,7 @@
           <a:p>
             <a:fld id="{857C8E90-7EDD-4CDC-BF79-D3D421C99482}" type="datetimeFigureOut">
               <a:rPr lang="en-US" smtClean="0"/>
-              <a:t>12/12/2022</a:t>
+              <a:t>12/13/2022</a:t>
             </a:fld>
             <a:endParaRPr lang="en-US"/>
           </a:p>
@@ -3545,7 +3541,7 @@
           <a:p>
             <a:fld id="{857C8E90-7EDD-4CDC-BF79-D3D421C99482}" type="datetimeFigureOut">
               <a:rPr lang="en-US" smtClean="0"/>
-              <a:t>12/12/2022</a:t>
+              <a:t>12/13/2022</a:t>
             </a:fld>
             <a:endParaRPr lang="en-US"/>
           </a:p>
@@ -3758,7 +3754,7 @@
           <a:p>
             <a:fld id="{857C8E90-7EDD-4CDC-BF79-D3D421C99482}" type="datetimeFigureOut">
               <a:rPr lang="en-US" smtClean="0"/>
-              <a:t>12/12/2022</a:t>
+              <a:t>12/13/2022</a:t>
             </a:fld>
             <a:endParaRPr lang="en-US"/>
           </a:p>
@@ -4165,7 +4161,7 @@
       </p:grpSpPr>
       <p:graphicFrame>
         <p:nvGraphicFramePr>
-          <p:cNvPr id="3" name="Chart 2">
+          <p:cNvPr id="4" name="Chart 3">
             <a:extLst>
               <a:ext uri="{FF2B5EF4-FFF2-40B4-BE49-F238E27FC236}">
                 <a16:creationId xmlns:a16="http://schemas.microsoft.com/office/drawing/2014/main" id="{9E6423DD-260E-4017-95EB-8246952674CD}"/>
@@ -4178,7 +4174,7 @@
           <p:nvPr>
             <p:extLst>
               <p:ext uri="{D42A27DB-BD31-4B8C-83A1-F6EECF244321}">
-                <p14:modId xmlns:p14="http://schemas.microsoft.com/office/powerpoint/2010/main" val="851452646"/>
+                <p14:modId xmlns:p14="http://schemas.microsoft.com/office/powerpoint/2010/main" val="947268013"/>
               </p:ext>
             </p:extLst>
           </p:nvPr>

</xml_diff>